<commit_message>
updated some more stuff
</commit_message>
<xml_diff>
--- a/notebooks/Figures.pptx
+++ b/notebooks/Figures.pptx
@@ -6290,18 +6290,13 @@
             <a:p>
               <a:pPr algn="ctr"/>
               <a:r>
-                <a:rPr lang="en-US" sz="1200">
+                <a:rPr lang="en-US" sz="1200" dirty="0">
                   <a:solidFill>
                     <a:schemeClr val="tx1"/>
                   </a:solidFill>
                 </a:rPr>
-                <a:t>env</a:t>
+                <a:t>splitter / combiner</a:t>
               </a:r>
-              <a:endParaRPr lang="en-US" sz="1200" dirty="0">
-                <a:solidFill>
-                  <a:schemeClr val="tx1"/>
-                </a:solidFill>
-              </a:endParaRPr>
             </a:p>
           </p:txBody>
         </p:sp>
@@ -6757,7 +6752,7 @@
         </p:nvSpPr>
         <p:spPr>
           <a:xfrm>
-            <a:off x="6219662" y="5420612"/>
+            <a:off x="6265628" y="5792482"/>
             <a:ext cx="1436914" cy="457200"/>
           </a:xfrm>
           <a:prstGeom prst="roundRect">
@@ -7315,6 +7310,225 @@
           <a:noFill/>
           <a:ln w="28575">
             <a:solidFill>
+              <a:srgbClr val="4472C4"/>
+            </a:solidFill>
+            <a:headEnd type="none" w="med" len="med"/>
+            <a:tailEnd type="arrow" w="med" len="med"/>
+          </a:ln>
+        </p:spPr>
+        <p:style>
+          <a:lnRef idx="2">
+            <a:schemeClr val="accent1">
+              <a:shade val="50000"/>
+            </a:schemeClr>
+          </a:lnRef>
+          <a:fillRef idx="1">
+            <a:schemeClr val="accent1"/>
+          </a:fillRef>
+          <a:effectRef idx="0">
+            <a:schemeClr val="accent1"/>
+          </a:effectRef>
+          <a:fontRef idx="minor">
+            <a:schemeClr val="lt1"/>
+          </a:fontRef>
+        </p:style>
+        <p:txBody>
+          <a:bodyPr rtlCol="0" anchor="ctr"/>
+          <a:lstStyle/>
+          <a:p>
+            <a:pPr algn="ctr"/>
+            <a:endParaRPr lang="en-US"/>
+          </a:p>
+        </p:txBody>
+      </p:sp>
+      <p:sp>
+        <p:nvSpPr>
+          <p:cNvPr id="141" name="TextBox 140">
+            <a:extLst>
+              <a:ext uri="{FF2B5EF4-FFF2-40B4-BE49-F238E27FC236}">
+                <a16:creationId xmlns:a16="http://schemas.microsoft.com/office/drawing/2014/main" id="{8C18393F-B52B-FD4D-85C9-E1FF152C7F54}"/>
+              </a:ext>
+            </a:extLst>
+          </p:cNvPr>
+          <p:cNvSpPr txBox="1"/>
+          <p:nvPr/>
+        </p:nvSpPr>
+        <p:spPr>
+          <a:xfrm rot="1252544">
+            <a:off x="3928026" y="5393030"/>
+            <a:ext cx="325730" cy="261610"/>
+          </a:xfrm>
+          <a:prstGeom prst="rect">
+            <a:avLst/>
+          </a:prstGeom>
+          <a:noFill/>
+        </p:spPr>
+        <p:txBody>
+          <a:bodyPr wrap="none" rtlCol="0">
+            <a:spAutoFit/>
+          </a:bodyPr>
+          <a:lstStyle/>
+          <a:p>
+            <a:r>
+              <a:rPr lang="en-US" sz="1100" dirty="0" err="1">
+                <a:solidFill>
+                  <a:srgbClr val="4472C4"/>
+                </a:solidFill>
+                <a:latin typeface="Courier" pitchFamily="2" charset="0"/>
+              </a:rPr>
+              <a:t>a</a:t>
+            </a:r>
+            <a:r>
+              <a:rPr lang="en-US" sz="1100" baseline="-25000" dirty="0" err="1">
+                <a:solidFill>
+                  <a:srgbClr val="4472C4"/>
+                </a:solidFill>
+                <a:latin typeface="Courier" pitchFamily="2" charset="0"/>
+              </a:rPr>
+              <a:t>i</a:t>
+            </a:r>
+            <a:endParaRPr lang="en-US" sz="1100" baseline="-25000" dirty="0">
+              <a:solidFill>
+                <a:srgbClr val="4472C4"/>
+              </a:solidFill>
+              <a:latin typeface="Courier" pitchFamily="2" charset="0"/>
+            </a:endParaRPr>
+          </a:p>
+        </p:txBody>
+      </p:sp>
+      <p:sp>
+        <p:nvSpPr>
+          <p:cNvPr id="142" name="TextBox 141">
+            <a:extLst>
+              <a:ext uri="{FF2B5EF4-FFF2-40B4-BE49-F238E27FC236}">
+                <a16:creationId xmlns:a16="http://schemas.microsoft.com/office/drawing/2014/main" id="{BA72AEB6-E79A-164D-AE97-4FEC3F763D5E}"/>
+              </a:ext>
+            </a:extLst>
+          </p:cNvPr>
+          <p:cNvSpPr txBox="1"/>
+          <p:nvPr/>
+        </p:nvSpPr>
+        <p:spPr>
+          <a:xfrm>
+            <a:off x="4763533" y="4625887"/>
+            <a:ext cx="702756" cy="307777"/>
+          </a:xfrm>
+          <a:prstGeom prst="rect">
+            <a:avLst/>
+          </a:prstGeom>
+          <a:noFill/>
+        </p:spPr>
+        <p:txBody>
+          <a:bodyPr wrap="none" rtlCol="0">
+            <a:spAutoFit/>
+          </a:bodyPr>
+          <a:lstStyle/>
+          <a:p>
+            <a:pPr algn="ctr"/>
+            <a:r>
+              <a:rPr lang="en-US" sz="1400" dirty="0"/>
+              <a:t>splitter</a:t>
+            </a:r>
+          </a:p>
+        </p:txBody>
+      </p:sp>
+      <p:sp>
+        <p:nvSpPr>
+          <p:cNvPr id="143" name="TextBox 142">
+            <a:extLst>
+              <a:ext uri="{FF2B5EF4-FFF2-40B4-BE49-F238E27FC236}">
+                <a16:creationId xmlns:a16="http://schemas.microsoft.com/office/drawing/2014/main" id="{6BF426BC-AC69-F74B-90D5-7672DC7D17A6}"/>
+              </a:ext>
+            </a:extLst>
+          </p:cNvPr>
+          <p:cNvSpPr txBox="1"/>
+          <p:nvPr/>
+        </p:nvSpPr>
+        <p:spPr>
+          <a:xfrm>
+            <a:off x="4677074" y="5764260"/>
+            <a:ext cx="878895" cy="307777"/>
+          </a:xfrm>
+          <a:prstGeom prst="rect">
+            <a:avLst/>
+          </a:prstGeom>
+          <a:noFill/>
+        </p:spPr>
+        <p:txBody>
+          <a:bodyPr wrap="none" rtlCol="0">
+            <a:spAutoFit/>
+          </a:bodyPr>
+          <a:lstStyle/>
+          <a:p>
+            <a:pPr algn="ctr"/>
+            <a:r>
+              <a:rPr lang="en-US" sz="1400" dirty="0"/>
+              <a:t>combiner</a:t>
+            </a:r>
+          </a:p>
+        </p:txBody>
+      </p:sp>
+      <p:sp>
+        <p:nvSpPr>
+          <p:cNvPr id="144" name="Freeform 143">
+            <a:extLst>
+              <a:ext uri="{FF2B5EF4-FFF2-40B4-BE49-F238E27FC236}">
+                <a16:creationId xmlns:a16="http://schemas.microsoft.com/office/drawing/2014/main" id="{18E5515C-F366-5E4B-A55E-AF176C9469F6}"/>
+              </a:ext>
+            </a:extLst>
+          </p:cNvPr>
+          <p:cNvSpPr/>
+          <p:nvPr/>
+        </p:nvSpPr>
+        <p:spPr>
+          <a:xfrm>
+            <a:off x="5818414" y="4969329"/>
+            <a:ext cx="386443" cy="81642"/>
+          </a:xfrm>
+          <a:custGeom>
+            <a:avLst/>
+            <a:gdLst>
+              <a:gd name="connsiteX0" fmla="*/ 0 w 386443"/>
+              <a:gd name="connsiteY0" fmla="*/ 0 h 81642"/>
+              <a:gd name="connsiteX1" fmla="*/ 163286 w 386443"/>
+              <a:gd name="connsiteY1" fmla="*/ 27214 h 81642"/>
+              <a:gd name="connsiteX2" fmla="*/ 386443 w 386443"/>
+              <a:gd name="connsiteY2" fmla="*/ 81642 h 81642"/>
+            </a:gdLst>
+            <a:ahLst/>
+            <a:cxnLst>
+              <a:cxn ang="0">
+                <a:pos x="connsiteX0" y="connsiteY0"/>
+              </a:cxn>
+              <a:cxn ang="0">
+                <a:pos x="connsiteX1" y="connsiteY1"/>
+              </a:cxn>
+              <a:cxn ang="0">
+                <a:pos x="connsiteX2" y="connsiteY2"/>
+              </a:cxn>
+            </a:cxnLst>
+            <a:rect l="l" t="t" r="r" b="b"/>
+            <a:pathLst>
+              <a:path w="386443" h="81642">
+                <a:moveTo>
+                  <a:pt x="0" y="0"/>
+                </a:moveTo>
+                <a:cubicBezTo>
+                  <a:pt x="49439" y="6803"/>
+                  <a:pt x="98879" y="13607"/>
+                  <a:pt x="163286" y="27214"/>
+                </a:cubicBezTo>
+                <a:cubicBezTo>
+                  <a:pt x="227693" y="40821"/>
+                  <a:pt x="307068" y="61231"/>
+                  <a:pt x="386443" y="81642"/>
+                </a:cubicBezTo>
+              </a:path>
+            </a:pathLst>
+          </a:custGeom>
+          <a:noFill/>
+          <a:ln w="19050">
+            <a:solidFill>
               <a:schemeClr val="tx1"/>
             </a:solidFill>
             <a:headEnd type="none" w="med" len="med"/>
@@ -7348,10 +7562,117 @@
       </p:sp>
       <p:sp>
         <p:nvSpPr>
-          <p:cNvPr id="141" name="TextBox 140">
-            <a:extLst>
-              <a:ext uri="{FF2B5EF4-FFF2-40B4-BE49-F238E27FC236}">
-                <a16:creationId xmlns:a16="http://schemas.microsoft.com/office/drawing/2014/main" id="{8C18393F-B52B-FD4D-85C9-E1FF152C7F54}"/>
+          <p:cNvPr id="146" name="Freeform 145">
+            <a:extLst>
+              <a:ext uri="{FF2B5EF4-FFF2-40B4-BE49-F238E27FC236}">
+                <a16:creationId xmlns:a16="http://schemas.microsoft.com/office/drawing/2014/main" id="{14ADD52E-6165-684A-9D2E-9DD38AC6BB04}"/>
+              </a:ext>
+            </a:extLst>
+          </p:cNvPr>
+          <p:cNvSpPr/>
+          <p:nvPr/>
+        </p:nvSpPr>
+        <p:spPr>
+          <a:xfrm>
+            <a:off x="5819709" y="4964569"/>
+            <a:ext cx="445919" cy="976106"/>
+          </a:xfrm>
+          <a:custGeom>
+            <a:avLst/>
+            <a:gdLst>
+              <a:gd name="connsiteX0" fmla="*/ 0 w 397329"/>
+              <a:gd name="connsiteY0" fmla="*/ 0 h 587828"/>
+              <a:gd name="connsiteX1" fmla="*/ 130629 w 397329"/>
+              <a:gd name="connsiteY1" fmla="*/ 217714 h 587828"/>
+              <a:gd name="connsiteX2" fmla="*/ 201386 w 397329"/>
+              <a:gd name="connsiteY2" fmla="*/ 500743 h 587828"/>
+              <a:gd name="connsiteX3" fmla="*/ 397329 w 397329"/>
+              <a:gd name="connsiteY3" fmla="*/ 587828 h 587828"/>
+            </a:gdLst>
+            <a:ahLst/>
+            <a:cxnLst>
+              <a:cxn ang="0">
+                <a:pos x="connsiteX0" y="connsiteY0"/>
+              </a:cxn>
+              <a:cxn ang="0">
+                <a:pos x="connsiteX1" y="connsiteY1"/>
+              </a:cxn>
+              <a:cxn ang="0">
+                <a:pos x="connsiteX2" y="connsiteY2"/>
+              </a:cxn>
+              <a:cxn ang="0">
+                <a:pos x="connsiteX3" y="connsiteY3"/>
+              </a:cxn>
+            </a:cxnLst>
+            <a:rect l="l" t="t" r="r" b="b"/>
+            <a:pathLst>
+              <a:path w="397329" h="587828">
+                <a:moveTo>
+                  <a:pt x="0" y="0"/>
+                </a:moveTo>
+                <a:cubicBezTo>
+                  <a:pt x="48532" y="67128"/>
+                  <a:pt x="97065" y="134257"/>
+                  <a:pt x="130629" y="217714"/>
+                </a:cubicBezTo>
+                <a:cubicBezTo>
+                  <a:pt x="164193" y="301171"/>
+                  <a:pt x="156936" y="439057"/>
+                  <a:pt x="201386" y="500743"/>
+                </a:cubicBezTo>
+                <a:cubicBezTo>
+                  <a:pt x="245836" y="562429"/>
+                  <a:pt x="321582" y="575128"/>
+                  <a:pt x="397329" y="587828"/>
+                </a:cubicBezTo>
+              </a:path>
+            </a:pathLst>
+          </a:custGeom>
+          <a:noFill/>
+          <a:ln w="19050">
+            <a:solidFill>
+              <a:schemeClr val="tx1"/>
+            </a:solidFill>
+            <a:headEnd type="none" w="med" len="med"/>
+            <a:tailEnd type="arrow" w="med" len="med"/>
+          </a:ln>
+        </p:spPr>
+        <p:style>
+          <a:lnRef idx="2">
+            <a:schemeClr val="accent1">
+              <a:shade val="50000"/>
+            </a:schemeClr>
+          </a:lnRef>
+          <a:fillRef idx="1">
+            <a:schemeClr val="accent1"/>
+          </a:fillRef>
+          <a:effectRef idx="0">
+            <a:schemeClr val="accent1"/>
+          </a:effectRef>
+          <a:fontRef idx="minor">
+            <a:schemeClr val="lt1"/>
+          </a:fontRef>
+        </p:style>
+        <p:txBody>
+          <a:bodyPr rot="0" spcFirstLastPara="0" vertOverflow="overflow" horzOverflow="overflow" vert="horz" wrap="square" lIns="91440" tIns="45720" rIns="91440" bIns="45720" numCol="1" spcCol="0" rtlCol="0" fromWordArt="0" anchor="ctr" anchorCtr="0" forceAA="0" compatLnSpc="1">
+            <a:prstTxWarp prst="textNoShape">
+              <a:avLst/>
+            </a:prstTxWarp>
+            <a:noAutofit/>
+          </a:bodyPr>
+          <a:lstStyle/>
+          <a:p>
+            <a:pPr algn="ctr"/>
+            <a:endParaRPr lang="en-US"/>
+          </a:p>
+        </p:txBody>
+      </p:sp>
+      <p:sp>
+        <p:nvSpPr>
+          <p:cNvPr id="147" name="TextBox 146">
+            <a:extLst>
+              <a:ext uri="{FF2B5EF4-FFF2-40B4-BE49-F238E27FC236}">
+                <a16:creationId xmlns:a16="http://schemas.microsoft.com/office/drawing/2014/main" id="{7360F7E1-91D1-6D46-9ACB-22DA297AD1BD}"/>
               </a:ext>
             </a:extLst>
           </p:cNvPr>
@@ -7359,9 +7680,9 @@
           <p:nvPr/>
         </p:nvSpPr>
         <p:spPr>
-          <a:xfrm rot="1252544">
-            <a:off x="3928026" y="5393030"/>
-            <a:ext cx="325730" cy="261610"/>
+          <a:xfrm rot="618528">
+            <a:off x="5613776" y="4792961"/>
+            <a:ext cx="798617" cy="200055"/>
           </a:xfrm>
           <a:prstGeom prst="rect">
             <a:avLst/>
@@ -7375,20 +7696,472 @@
           <a:lstStyle/>
           <a:p>
             <a:r>
-              <a:rPr lang="en-US" sz="1100" dirty="0" err="1">
+              <a:rPr lang="en-US" sz="700" dirty="0">
+                <a:latin typeface="Courier" pitchFamily="2" charset="0"/>
+              </a:rPr>
+              <a:t>s</a:t>
+            </a:r>
+            <a:r>
+              <a:rPr lang="en-US" sz="700" baseline="-25000" dirty="0">
+                <a:latin typeface="Courier" pitchFamily="2" charset="0"/>
+              </a:rPr>
+              <a:t>i</a:t>
+            </a:r>
+            <a:r>
+              <a:rPr lang="en-US" sz="700" baseline="30000" dirty="0">
+                <a:latin typeface="Courier" pitchFamily="2" charset="0"/>
+              </a:rPr>
+              <a:t>0</a:t>
+            </a:r>
+            <a:r>
+              <a:rPr lang="en-US" sz="700" dirty="0"/>
+              <a:t>, </a:t>
+            </a:r>
+            <a:r>
+              <a:rPr lang="en-US" sz="700" dirty="0">
+                <a:latin typeface="Courier" pitchFamily="2" charset="0"/>
+              </a:rPr>
+              <a:t>r</a:t>
+            </a:r>
+            <a:r>
+              <a:rPr lang="en-US" sz="700" baseline="-25000" dirty="0">
+                <a:latin typeface="Courier" pitchFamily="2" charset="0"/>
+              </a:rPr>
+              <a:t>i+1</a:t>
+            </a:r>
+            <a:r>
+              <a:rPr lang="en-US" sz="700" baseline="30000" dirty="0">
+                <a:latin typeface="Courier" pitchFamily="2" charset="0"/>
+              </a:rPr>
+              <a:t>0</a:t>
+            </a:r>
+            <a:r>
+              <a:rPr lang="en-US" sz="700" dirty="0">
+                <a:latin typeface="Courier" pitchFamily="2" charset="0"/>
+              </a:rPr>
+              <a:t>,s</a:t>
+            </a:r>
+            <a:r>
+              <a:rPr lang="en-US" sz="700" baseline="-25000" dirty="0">
+                <a:latin typeface="Courier" pitchFamily="2" charset="0"/>
+              </a:rPr>
+              <a:t>i+1</a:t>
+            </a:r>
+            <a:r>
+              <a:rPr lang="en-US" sz="700" baseline="30000" dirty="0">
+                <a:latin typeface="Courier" pitchFamily="2" charset="0"/>
+              </a:rPr>
+              <a:t>0</a:t>
+            </a:r>
+          </a:p>
+        </p:txBody>
+      </p:sp>
+      <p:sp>
+        <p:nvSpPr>
+          <p:cNvPr id="148" name="TextBox 147">
+            <a:extLst>
+              <a:ext uri="{FF2B5EF4-FFF2-40B4-BE49-F238E27FC236}">
+                <a16:creationId xmlns:a16="http://schemas.microsoft.com/office/drawing/2014/main" id="{F57C550F-06D4-E44C-9B2A-5ED98A74A89C}"/>
+              </a:ext>
+            </a:extLst>
+          </p:cNvPr>
+          <p:cNvSpPr txBox="1"/>
+          <p:nvPr/>
+        </p:nvSpPr>
+        <p:spPr>
+          <a:xfrm rot="4593438">
+            <a:off x="5645179" y="5310978"/>
+            <a:ext cx="798617" cy="200055"/>
+          </a:xfrm>
+          <a:prstGeom prst="rect">
+            <a:avLst/>
+          </a:prstGeom>
+          <a:noFill/>
+        </p:spPr>
+        <p:txBody>
+          <a:bodyPr wrap="none" rtlCol="0">
+            <a:spAutoFit/>
+          </a:bodyPr>
+          <a:lstStyle/>
+          <a:p>
+            <a:r>
+              <a:rPr lang="en-US" sz="700" dirty="0">
+                <a:latin typeface="Courier" pitchFamily="2" charset="0"/>
+              </a:rPr>
+              <a:t>s</a:t>
+            </a:r>
+            <a:r>
+              <a:rPr lang="en-US" sz="700" baseline="-25000" dirty="0">
+                <a:latin typeface="Courier" pitchFamily="2" charset="0"/>
+              </a:rPr>
+              <a:t>i</a:t>
+            </a:r>
+            <a:r>
+              <a:rPr lang="en-US" sz="700" baseline="30000" dirty="0">
+                <a:latin typeface="Courier" pitchFamily="2" charset="0"/>
+              </a:rPr>
+              <a:t>1</a:t>
+            </a:r>
+            <a:r>
+              <a:rPr lang="en-US" sz="700" dirty="0"/>
+              <a:t>, </a:t>
+            </a:r>
+            <a:r>
+              <a:rPr lang="en-US" sz="700" dirty="0">
+                <a:latin typeface="Courier" pitchFamily="2" charset="0"/>
+              </a:rPr>
+              <a:t>r</a:t>
+            </a:r>
+            <a:r>
+              <a:rPr lang="en-US" sz="700" baseline="-25000" dirty="0">
+                <a:latin typeface="Courier" pitchFamily="2" charset="0"/>
+              </a:rPr>
+              <a:t>i+1</a:t>
+            </a:r>
+            <a:r>
+              <a:rPr lang="en-US" sz="700" baseline="30000" dirty="0">
+                <a:latin typeface="Courier" pitchFamily="2" charset="0"/>
+              </a:rPr>
+              <a:t>1</a:t>
+            </a:r>
+            <a:r>
+              <a:rPr lang="en-US" sz="700" dirty="0">
+                <a:latin typeface="Courier" pitchFamily="2" charset="0"/>
+              </a:rPr>
+              <a:t>,s</a:t>
+            </a:r>
+            <a:r>
+              <a:rPr lang="en-US" sz="700" baseline="-25000" dirty="0">
+                <a:latin typeface="Courier" pitchFamily="2" charset="0"/>
+              </a:rPr>
+              <a:t>i+1</a:t>
+            </a:r>
+            <a:r>
+              <a:rPr lang="en-US" sz="700" baseline="30000" dirty="0">
+                <a:latin typeface="Courier" pitchFamily="2" charset="0"/>
+              </a:rPr>
+              <a:t>1</a:t>
+            </a:r>
+          </a:p>
+        </p:txBody>
+      </p:sp>
+      <p:sp>
+        <p:nvSpPr>
+          <p:cNvPr id="150" name="Freeform 149">
+            <a:extLst>
+              <a:ext uri="{FF2B5EF4-FFF2-40B4-BE49-F238E27FC236}">
+                <a16:creationId xmlns:a16="http://schemas.microsoft.com/office/drawing/2014/main" id="{F4D6FBDB-E478-B248-9632-208F7B6F229A}"/>
+              </a:ext>
+            </a:extLst>
+          </p:cNvPr>
+          <p:cNvSpPr/>
+          <p:nvPr/>
+        </p:nvSpPr>
+        <p:spPr>
+          <a:xfrm>
+            <a:off x="5802086" y="5285014"/>
+            <a:ext cx="1224643" cy="385740"/>
+          </a:xfrm>
+          <a:custGeom>
+            <a:avLst/>
+            <a:gdLst>
+              <a:gd name="connsiteX0" fmla="*/ 1224643 w 1224643"/>
+              <a:gd name="connsiteY0" fmla="*/ 0 h 495300"/>
+              <a:gd name="connsiteX1" fmla="*/ 838200 w 1224643"/>
+              <a:gd name="connsiteY1" fmla="*/ 359229 h 495300"/>
+              <a:gd name="connsiteX2" fmla="*/ 0 w 1224643"/>
+              <a:gd name="connsiteY2" fmla="*/ 495300 h 495300"/>
+            </a:gdLst>
+            <a:ahLst/>
+            <a:cxnLst>
+              <a:cxn ang="0">
+                <a:pos x="connsiteX0" y="connsiteY0"/>
+              </a:cxn>
+              <a:cxn ang="0">
+                <a:pos x="connsiteX1" y="connsiteY1"/>
+              </a:cxn>
+              <a:cxn ang="0">
+                <a:pos x="connsiteX2" y="connsiteY2"/>
+              </a:cxn>
+            </a:cxnLst>
+            <a:rect l="l" t="t" r="r" b="b"/>
+            <a:pathLst>
+              <a:path w="1224643" h="495300">
+                <a:moveTo>
+                  <a:pt x="1224643" y="0"/>
+                </a:moveTo>
+                <a:cubicBezTo>
+                  <a:pt x="1133475" y="138339"/>
+                  <a:pt x="1042307" y="276679"/>
+                  <a:pt x="838200" y="359229"/>
+                </a:cubicBezTo>
+                <a:cubicBezTo>
+                  <a:pt x="634093" y="441779"/>
+                  <a:pt x="317046" y="468539"/>
+                  <a:pt x="0" y="495300"/>
+                </a:cubicBezTo>
+              </a:path>
+            </a:pathLst>
+          </a:custGeom>
+          <a:noFill/>
+          <a:ln w="19050">
+            <a:solidFill>
+              <a:srgbClr val="4472C4"/>
+            </a:solidFill>
+            <a:headEnd type="none" w="med" len="med"/>
+            <a:tailEnd type="arrow" w="med" len="med"/>
+          </a:ln>
+        </p:spPr>
+        <p:style>
+          <a:lnRef idx="2">
+            <a:schemeClr val="accent1">
+              <a:shade val="50000"/>
+            </a:schemeClr>
+          </a:lnRef>
+          <a:fillRef idx="1">
+            <a:schemeClr val="accent1"/>
+          </a:fillRef>
+          <a:effectRef idx="0">
+            <a:schemeClr val="accent1"/>
+          </a:effectRef>
+          <a:fontRef idx="minor">
+            <a:schemeClr val="lt1"/>
+          </a:fontRef>
+        </p:style>
+        <p:txBody>
+          <a:bodyPr rot="0" spcFirstLastPara="0" vertOverflow="overflow" horzOverflow="overflow" vert="horz" wrap="square" lIns="91440" tIns="45720" rIns="91440" bIns="45720" numCol="1" spcCol="0" rtlCol="0" fromWordArt="0" anchor="ctr" anchorCtr="0" forceAA="0" compatLnSpc="1">
+            <a:prstTxWarp prst="textNoShape">
+              <a:avLst/>
+            </a:prstTxWarp>
+            <a:noAutofit/>
+          </a:bodyPr>
+          <a:lstStyle/>
+          <a:p>
+            <a:pPr algn="ctr"/>
+            <a:endParaRPr lang="en-US"/>
+          </a:p>
+        </p:txBody>
+      </p:sp>
+      <p:sp>
+        <p:nvSpPr>
+          <p:cNvPr id="151" name="TextBox 150">
+            <a:extLst>
+              <a:ext uri="{FF2B5EF4-FFF2-40B4-BE49-F238E27FC236}">
+                <a16:creationId xmlns:a16="http://schemas.microsoft.com/office/drawing/2014/main" id="{B0AE210A-9EE9-D64D-A704-D99A1ABF06A8}"/>
+              </a:ext>
+            </a:extLst>
+          </p:cNvPr>
+          <p:cNvSpPr txBox="1"/>
+          <p:nvPr/>
+        </p:nvSpPr>
+        <p:spPr>
+          <a:xfrm rot="20134905">
+            <a:off x="6362615" y="5391242"/>
+            <a:ext cx="373820" cy="253916"/>
+          </a:xfrm>
+          <a:prstGeom prst="rect">
+            <a:avLst/>
+          </a:prstGeom>
+          <a:noFill/>
+        </p:spPr>
+        <p:txBody>
+          <a:bodyPr wrap="none" rtlCol="0">
+            <a:spAutoFit/>
+          </a:bodyPr>
+          <a:lstStyle/>
+          <a:p>
+            <a:r>
+              <a:rPr lang="en-US" sz="1050" dirty="0">
+                <a:solidFill>
+                  <a:srgbClr val="4472C4"/>
+                </a:solidFill>
                 <a:latin typeface="Courier" pitchFamily="2" charset="0"/>
               </a:rPr>
               <a:t>a</a:t>
             </a:r>
             <a:r>
-              <a:rPr lang="en-US" sz="1100" baseline="-25000" dirty="0" err="1">
+              <a:rPr lang="en-US" sz="1050" baseline="-25000" dirty="0">
+                <a:solidFill>
+                  <a:srgbClr val="4472C4"/>
+                </a:solidFill>
                 <a:latin typeface="Courier" pitchFamily="2" charset="0"/>
               </a:rPr>
               <a:t>i</a:t>
             </a:r>
-            <a:endParaRPr lang="en-US" sz="1100" baseline="-25000" dirty="0">
-              <a:latin typeface="Courier" pitchFamily="2" charset="0"/>
-            </a:endParaRPr>
+            <a:r>
+              <a:rPr lang="en-US" sz="1050" baseline="30000" dirty="0">
+                <a:solidFill>
+                  <a:srgbClr val="4472C4"/>
+                </a:solidFill>
+                <a:latin typeface="Courier" pitchFamily="2" charset="0"/>
+              </a:rPr>
+              <a:t>0</a:t>
+            </a:r>
+          </a:p>
+        </p:txBody>
+      </p:sp>
+      <p:sp>
+        <p:nvSpPr>
+          <p:cNvPr id="152" name="TextBox 151">
+            <a:extLst>
+              <a:ext uri="{FF2B5EF4-FFF2-40B4-BE49-F238E27FC236}">
+                <a16:creationId xmlns:a16="http://schemas.microsoft.com/office/drawing/2014/main" id="{73852DE7-FEBA-A24E-998B-72D5856FE544}"/>
+              </a:ext>
+            </a:extLst>
+          </p:cNvPr>
+          <p:cNvSpPr txBox="1"/>
+          <p:nvPr/>
+        </p:nvSpPr>
+        <p:spPr>
+          <a:xfrm rot="618528">
+            <a:off x="5860321" y="6055167"/>
+            <a:ext cx="373820" cy="253916"/>
+          </a:xfrm>
+          <a:prstGeom prst="rect">
+            <a:avLst/>
+          </a:prstGeom>
+          <a:noFill/>
+        </p:spPr>
+        <p:txBody>
+          <a:bodyPr wrap="none" rtlCol="0">
+            <a:spAutoFit/>
+          </a:bodyPr>
+          <a:lstStyle/>
+          <a:p>
+            <a:r>
+              <a:rPr lang="en-US" sz="1050" dirty="0">
+                <a:solidFill>
+                  <a:srgbClr val="4472C4"/>
+                </a:solidFill>
+                <a:latin typeface="Courier" pitchFamily="2" charset="0"/>
+              </a:rPr>
+              <a:t>a</a:t>
+            </a:r>
+            <a:r>
+              <a:rPr lang="en-US" sz="1050" baseline="-25000" dirty="0">
+                <a:solidFill>
+                  <a:srgbClr val="4472C4"/>
+                </a:solidFill>
+                <a:latin typeface="Courier" pitchFamily="2" charset="0"/>
+              </a:rPr>
+              <a:t>i</a:t>
+            </a:r>
+            <a:r>
+              <a:rPr lang="en-US" sz="1050" baseline="30000" dirty="0">
+                <a:solidFill>
+                  <a:srgbClr val="4472C4"/>
+                </a:solidFill>
+                <a:latin typeface="Courier" pitchFamily="2" charset="0"/>
+              </a:rPr>
+              <a:t>1</a:t>
+            </a:r>
+          </a:p>
+        </p:txBody>
+      </p:sp>
+      <p:sp>
+        <p:nvSpPr>
+          <p:cNvPr id="153" name="Freeform 152">
+            <a:extLst>
+              <a:ext uri="{FF2B5EF4-FFF2-40B4-BE49-F238E27FC236}">
+                <a16:creationId xmlns:a16="http://schemas.microsoft.com/office/drawing/2014/main" id="{9DE9A739-778B-DF4C-8756-3221D2910B07}"/>
+              </a:ext>
+            </a:extLst>
+          </p:cNvPr>
+          <p:cNvSpPr/>
+          <p:nvPr/>
+        </p:nvSpPr>
+        <p:spPr>
+          <a:xfrm>
+            <a:off x="5796643" y="5785757"/>
+            <a:ext cx="457200" cy="326842"/>
+          </a:xfrm>
+          <a:custGeom>
+            <a:avLst/>
+            <a:gdLst>
+              <a:gd name="connsiteX0" fmla="*/ 457200 w 457200"/>
+              <a:gd name="connsiteY0" fmla="*/ 326572 h 326842"/>
+              <a:gd name="connsiteX1" fmla="*/ 206828 w 457200"/>
+              <a:gd name="connsiteY1" fmla="*/ 288472 h 326842"/>
+              <a:gd name="connsiteX2" fmla="*/ 146957 w 457200"/>
+              <a:gd name="connsiteY2" fmla="*/ 87086 h 326842"/>
+              <a:gd name="connsiteX3" fmla="*/ 0 w 457200"/>
+              <a:gd name="connsiteY3" fmla="*/ 0 h 326842"/>
+            </a:gdLst>
+            <a:ahLst/>
+            <a:cxnLst>
+              <a:cxn ang="0">
+                <a:pos x="connsiteX0" y="connsiteY0"/>
+              </a:cxn>
+              <a:cxn ang="0">
+                <a:pos x="connsiteX1" y="connsiteY1"/>
+              </a:cxn>
+              <a:cxn ang="0">
+                <a:pos x="connsiteX2" y="connsiteY2"/>
+              </a:cxn>
+              <a:cxn ang="0">
+                <a:pos x="connsiteX3" y="connsiteY3"/>
+              </a:cxn>
+            </a:cxnLst>
+            <a:rect l="l" t="t" r="r" b="b"/>
+            <a:pathLst>
+              <a:path w="457200" h="326842">
+                <a:moveTo>
+                  <a:pt x="457200" y="326572"/>
+                </a:moveTo>
+                <a:cubicBezTo>
+                  <a:pt x="357867" y="327479"/>
+                  <a:pt x="258535" y="328386"/>
+                  <a:pt x="206828" y="288472"/>
+                </a:cubicBezTo>
+                <a:cubicBezTo>
+                  <a:pt x="155121" y="248558"/>
+                  <a:pt x="181428" y="135165"/>
+                  <a:pt x="146957" y="87086"/>
+                </a:cubicBezTo>
+                <a:cubicBezTo>
+                  <a:pt x="112486" y="39007"/>
+                  <a:pt x="56243" y="19503"/>
+                  <a:pt x="0" y="0"/>
+                </a:cubicBezTo>
+              </a:path>
+            </a:pathLst>
+          </a:custGeom>
+          <a:noFill/>
+          <a:ln w="19050">
+            <a:solidFill>
+              <a:srgbClr val="4472C4"/>
+            </a:solidFill>
+            <a:headEnd type="none" w="med" len="med"/>
+            <a:tailEnd type="arrow" w="med" len="med"/>
+          </a:ln>
+        </p:spPr>
+        <p:style>
+          <a:lnRef idx="2">
+            <a:schemeClr val="accent1">
+              <a:shade val="50000"/>
+            </a:schemeClr>
+          </a:lnRef>
+          <a:fillRef idx="1">
+            <a:schemeClr val="accent1"/>
+          </a:fillRef>
+          <a:effectRef idx="0">
+            <a:schemeClr val="accent1"/>
+          </a:effectRef>
+          <a:fontRef idx="minor">
+            <a:schemeClr val="lt1"/>
+          </a:fontRef>
+        </p:style>
+        <p:txBody>
+          <a:bodyPr rot="0" spcFirstLastPara="0" vertOverflow="overflow" horzOverflow="overflow" vert="horz" wrap="square" lIns="91440" tIns="45720" rIns="91440" bIns="45720" numCol="1" spcCol="0" rtlCol="0" fromWordArt="0" anchor="ctr" anchorCtr="0" forceAA="0" compatLnSpc="1">
+            <a:prstTxWarp prst="textNoShape">
+              <a:avLst/>
+            </a:prstTxWarp>
+            <a:noAutofit/>
+          </a:bodyPr>
+          <a:lstStyle/>
+          <a:p>
+            <a:pPr algn="ctr"/>
+            <a:endParaRPr lang="en-US"/>
           </a:p>
         </p:txBody>
       </p:sp>

</xml_diff>

<commit_message>
updated the word document - mostly complete
</commit_message>
<xml_diff>
--- a/notebooks/Figures.pptx
+++ b/notebooks/Figures.pptx
@@ -5,10 +5,11 @@
     <p:sldMasterId id="2147483648" r:id="rId1"/>
   </p:sldMasterIdLst>
   <p:notesMasterIdLst>
-    <p:notesMasterId r:id="rId3"/>
+    <p:notesMasterId r:id="rId4"/>
   </p:notesMasterIdLst>
   <p:sldIdLst>
     <p:sldId id="256" r:id="rId2"/>
+    <p:sldId id="257" r:id="rId3"/>
   </p:sldIdLst>
   <p:sldSz cx="12192000" cy="6858000"/>
   <p:notesSz cx="6858000" cy="9144000"/>
@@ -107,6 +108,11 @@
       </a:defRPr>
     </a:lvl9pPr>
   </p:defaultTextStyle>
+  <p:extLst>
+    <p:ext uri="{EFAFB233-063F-42B5-8137-9DF3F51BA10A}">
+      <p15:sldGuideLst xmlns:p15="http://schemas.microsoft.com/office/powerpoint/2012/main"/>
+    </p:ext>
+  </p:extLst>
 </p:presentation>
 </file>
 
@@ -192,7 +198,7 @@
           <a:p>
             <a:fld id="{6BE813A2-28D2-B443-A198-610D34137A36}" type="datetimeFigureOut">
               <a:rPr lang="en-US" smtClean="0"/>
-              <a:t>12/14/18</a:t>
+              <a:t>12/16/18</a:t>
             </a:fld>
             <a:endParaRPr lang="en-US"/>
           </a:p>
@@ -690,7 +696,7 @@
           <a:p>
             <a:fld id="{0C6F21FB-C320-3B4F-AC49-57186FDEECD7}" type="datetimeFigureOut">
               <a:rPr lang="en-US" smtClean="0"/>
-              <a:t>12/14/18</a:t>
+              <a:t>12/16/18</a:t>
             </a:fld>
             <a:endParaRPr lang="en-US"/>
           </a:p>
@@ -888,7 +894,7 @@
           <a:p>
             <a:fld id="{0C6F21FB-C320-3B4F-AC49-57186FDEECD7}" type="datetimeFigureOut">
               <a:rPr lang="en-US" smtClean="0"/>
-              <a:t>12/14/18</a:t>
+              <a:t>12/16/18</a:t>
             </a:fld>
             <a:endParaRPr lang="en-US"/>
           </a:p>
@@ -1096,7 +1102,7 @@
           <a:p>
             <a:fld id="{0C6F21FB-C320-3B4F-AC49-57186FDEECD7}" type="datetimeFigureOut">
               <a:rPr lang="en-US" smtClean="0"/>
-              <a:t>12/14/18</a:t>
+              <a:t>12/16/18</a:t>
             </a:fld>
             <a:endParaRPr lang="en-US"/>
           </a:p>
@@ -1294,7 +1300,7 @@
           <a:p>
             <a:fld id="{0C6F21FB-C320-3B4F-AC49-57186FDEECD7}" type="datetimeFigureOut">
               <a:rPr lang="en-US" smtClean="0"/>
-              <a:t>12/14/18</a:t>
+              <a:t>12/16/18</a:t>
             </a:fld>
             <a:endParaRPr lang="en-US"/>
           </a:p>
@@ -1569,7 +1575,7 @@
           <a:p>
             <a:fld id="{0C6F21FB-C320-3B4F-AC49-57186FDEECD7}" type="datetimeFigureOut">
               <a:rPr lang="en-US" smtClean="0"/>
-              <a:t>12/14/18</a:t>
+              <a:t>12/16/18</a:t>
             </a:fld>
             <a:endParaRPr lang="en-US"/>
           </a:p>
@@ -1834,7 +1840,7 @@
           <a:p>
             <a:fld id="{0C6F21FB-C320-3B4F-AC49-57186FDEECD7}" type="datetimeFigureOut">
               <a:rPr lang="en-US" smtClean="0"/>
-              <a:t>12/14/18</a:t>
+              <a:t>12/16/18</a:t>
             </a:fld>
             <a:endParaRPr lang="en-US"/>
           </a:p>
@@ -2246,7 +2252,7 @@
           <a:p>
             <a:fld id="{0C6F21FB-C320-3B4F-AC49-57186FDEECD7}" type="datetimeFigureOut">
               <a:rPr lang="en-US" smtClean="0"/>
-              <a:t>12/14/18</a:t>
+              <a:t>12/16/18</a:t>
             </a:fld>
             <a:endParaRPr lang="en-US"/>
           </a:p>
@@ -2387,7 +2393,7 @@
           <a:p>
             <a:fld id="{0C6F21FB-C320-3B4F-AC49-57186FDEECD7}" type="datetimeFigureOut">
               <a:rPr lang="en-US" smtClean="0"/>
-              <a:t>12/14/18</a:t>
+              <a:t>12/16/18</a:t>
             </a:fld>
             <a:endParaRPr lang="en-US"/>
           </a:p>
@@ -2500,7 +2506,7 @@
           <a:p>
             <a:fld id="{0C6F21FB-C320-3B4F-AC49-57186FDEECD7}" type="datetimeFigureOut">
               <a:rPr lang="en-US" smtClean="0"/>
-              <a:t>12/14/18</a:t>
+              <a:t>12/16/18</a:t>
             </a:fld>
             <a:endParaRPr lang="en-US"/>
           </a:p>
@@ -2811,7 +2817,7 @@
           <a:p>
             <a:fld id="{0C6F21FB-C320-3B4F-AC49-57186FDEECD7}" type="datetimeFigureOut">
               <a:rPr lang="en-US" smtClean="0"/>
-              <a:t>12/14/18</a:t>
+              <a:t>12/16/18</a:t>
             </a:fld>
             <a:endParaRPr lang="en-US"/>
           </a:p>
@@ -3099,7 +3105,7 @@
           <a:p>
             <a:fld id="{0C6F21FB-C320-3B4F-AC49-57186FDEECD7}" type="datetimeFigureOut">
               <a:rPr lang="en-US" smtClean="0"/>
-              <a:t>12/14/18</a:t>
+              <a:t>12/16/18</a:t>
             </a:fld>
             <a:endParaRPr lang="en-US"/>
           </a:p>
@@ -3340,7 +3346,7 @@
           <a:p>
             <a:fld id="{0C6F21FB-C320-3B4F-AC49-57186FDEECD7}" type="datetimeFigureOut">
               <a:rPr lang="en-US" smtClean="0"/>
-              <a:t>12/14/18</a:t>
+              <a:t>12/16/18</a:t>
             </a:fld>
             <a:endParaRPr lang="en-US"/>
           </a:p>
@@ -8169,6 +8175,66 @@
     <p:extLst>
       <p:ext uri="{BB962C8B-B14F-4D97-AF65-F5344CB8AC3E}">
         <p14:creationId xmlns:p14="http://schemas.microsoft.com/office/powerpoint/2010/main" val="3297400806"/>
+      </p:ext>
+    </p:extLst>
+  </p:cSld>
+  <p:clrMapOvr>
+    <a:masterClrMapping/>
+  </p:clrMapOvr>
+</p:sld>
+</file>
+
+<file path=ppt/slides/slide2.xml><?xml version="1.0" encoding="utf-8"?>
+<p:sld xmlns:a="http://schemas.openxmlformats.org/drawingml/2006/main" xmlns:r="http://schemas.openxmlformats.org/officeDocument/2006/relationships" xmlns:p="http://schemas.openxmlformats.org/presentationml/2006/main">
+  <p:cSld>
+    <p:spTree>
+      <p:nvGrpSpPr>
+        <p:cNvPr id="1" name=""/>
+        <p:cNvGrpSpPr/>
+        <p:nvPr/>
+      </p:nvGrpSpPr>
+      <p:grpSpPr>
+        <a:xfrm>
+          <a:off x="0" y="0"/>
+          <a:ext cx="0" cy="0"/>
+          <a:chOff x="0" y="0"/>
+          <a:chExt cx="0" cy="0"/>
+        </a:xfrm>
+      </p:grpSpPr>
+      <p:pic>
+        <p:nvPicPr>
+          <p:cNvPr id="2" name="Picture 1">
+            <a:extLst>
+              <a:ext uri="{FF2B5EF4-FFF2-40B4-BE49-F238E27FC236}">
+                <a16:creationId xmlns:a16="http://schemas.microsoft.com/office/drawing/2014/main" id="{20B57E54-1695-724B-BF4B-4D75F2FBFB55}"/>
+              </a:ext>
+            </a:extLst>
+          </p:cNvPr>
+          <p:cNvPicPr>
+            <a:picLocks noChangeAspect="1"/>
+          </p:cNvPicPr>
+          <p:nvPr/>
+        </p:nvPicPr>
+        <p:blipFill>
+          <a:blip r:embed="rId2"/>
+          <a:stretch>
+            <a:fillRect/>
+          </a:stretch>
+        </p:blipFill>
+        <p:spPr>
+          <a:xfrm>
+            <a:off x="773734" y="495557"/>
+            <a:ext cx="2913764" cy="1787611"/>
+          </a:xfrm>
+          <a:prstGeom prst="rect">
+            <a:avLst/>
+          </a:prstGeom>
+        </p:spPr>
+      </p:pic>
+    </p:spTree>
+    <p:extLst>
+      <p:ext uri="{BB962C8B-B14F-4D97-AF65-F5344CB8AC3E}">
+        <p14:creationId xmlns:p14="http://schemas.microsoft.com/office/powerpoint/2010/main" val="1903577000"/>
       </p:ext>
     </p:extLst>
   </p:cSld>

</xml_diff>